<commit_message>
Updated MSDN benefits slide
</commit_message>
<xml_diff>
--- a/1-Keynote.pptx
+++ b/1-Keynote.pptx
@@ -11,7 +11,7 @@
     <p:sldMasterId id="2147483758" r:id="rId7"/>
   </p:sldMasterIdLst>
   <p:notesMasterIdLst>
-    <p:notesMasterId r:id="rId33"/>
+    <p:notesMasterId r:id="rId32"/>
   </p:notesMasterIdLst>
   <p:sldIdLst>
     <p:sldId id="257" r:id="rId8"/>
@@ -30,15 +30,14 @@
     <p:sldId id="284" r:id="rId21"/>
     <p:sldId id="285" r:id="rId22"/>
     <p:sldId id="286" r:id="rId23"/>
-    <p:sldId id="290" r:id="rId24"/>
-    <p:sldId id="296" r:id="rId25"/>
-    <p:sldId id="295" r:id="rId26"/>
-    <p:sldId id="291" r:id="rId27"/>
-    <p:sldId id="292" r:id="rId28"/>
-    <p:sldId id="293" r:id="rId29"/>
-    <p:sldId id="294" r:id="rId30"/>
-    <p:sldId id="289" r:id="rId31"/>
-    <p:sldId id="263" r:id="rId32"/>
+    <p:sldId id="296" r:id="rId24"/>
+    <p:sldId id="295" r:id="rId25"/>
+    <p:sldId id="291" r:id="rId26"/>
+    <p:sldId id="292" r:id="rId27"/>
+    <p:sldId id="293" r:id="rId28"/>
+    <p:sldId id="294" r:id="rId29"/>
+    <p:sldId id="289" r:id="rId30"/>
+    <p:sldId id="263" r:id="rId31"/>
   </p:sldIdLst>
   <p:sldSz cx="12192000" cy="6858000"/>
   <p:notesSz cx="6858000" cy="9144000"/>
@@ -227,7 +226,7 @@
           <a:p>
             <a:fld id="{0E990FE3-7537-4D15-A9F5-FDF1805FD5F8}" type="datetimeFigureOut">
               <a:rPr lang="en-US" smtClean="0"/>
-              <a:t>10/11/2013</a:t>
+              <a:t>10/28/2013</a:t>
             </a:fld>
             <a:endParaRPr lang="en-US"/>
           </a:p>
@@ -1400,7 +1399,7 @@
           <a:p>
             <a:fld id="{50A28030-5D59-4E14-AFE9-B93D391AF3AF}" type="datetime1">
               <a:rPr lang="en-US" smtClean="0"/>
-              <a:t>10/11/2013</a:t>
+              <a:t>10/28/2013</a:t>
             </a:fld>
             <a:endParaRPr lang="en-US" dirty="0"/>
           </a:p>
@@ -1424,7 +1423,7 @@
             <a:fld id="{B4008EB6-D09E-4580-8CD6-DDB14511944F}" type="slidenum">
               <a:rPr lang="en-US" smtClean="0"/>
               <a:pPr/>
-              <a:t>18</a:t>
+              <a:t>17</a:t>
             </a:fld>
             <a:endParaRPr lang="en-US" dirty="0"/>
           </a:p>
@@ -1509,7 +1508,7 @@
             <a:fld id="{82AABF77-E2E4-44CA-BA5C-65E132CF08D8}" type="slidenum">
               <a:rPr lang="en-US" smtClean="0"/>
               <a:pPr/>
-              <a:t>23</a:t>
+              <a:t>22</a:t>
             </a:fld>
             <a:endParaRPr lang="en-US" dirty="0"/>
           </a:p>
@@ -1594,7 +1593,7 @@
             <a:fld id="{82AABF77-E2E4-44CA-BA5C-65E132CF08D8}" type="slidenum">
               <a:rPr lang="en-US" smtClean="0"/>
               <a:pPr/>
-              <a:t>24</a:t>
+              <a:t>23</a:t>
             </a:fld>
             <a:endParaRPr lang="en-US" dirty="0"/>
           </a:p>
@@ -11394,13 +11393,13 @@
   <p:clrMapOvr>
     <a:masterClrMapping/>
   </p:clrMapOvr>
-  <mc:AlternateContent xmlns:mc="http://schemas.openxmlformats.org/markup-compatibility/2006">
-    <mc:Choice xmlns:p14="http://schemas.microsoft.com/office/powerpoint/2010/main" Requires="p14">
+  <mc:AlternateContent xmlns:mc="http://schemas.openxmlformats.org/markup-compatibility/2006" xmlns:p14="http://schemas.microsoft.com/office/powerpoint/2010/main">
+    <mc:Choice Requires="p14">
       <p:transition spd="med" p14:dur="700">
         <p:fade/>
       </p:transition>
     </mc:Choice>
-    <mc:Fallback>
+    <mc:Fallback xmlns="">
       <p:transition spd="med">
         <p:fade/>
       </p:transition>
@@ -21708,295 +21707,6 @@
 <file path=ppt/slides/slide17.xml><?xml version="1.0" encoding="utf-8"?>
 <p:sld xmlns:a="http://schemas.openxmlformats.org/drawingml/2006/main" xmlns:r="http://schemas.openxmlformats.org/officeDocument/2006/relationships" xmlns:p="http://schemas.openxmlformats.org/presentationml/2006/main">
   <p:cSld>
-    <p:bg>
-      <p:bgPr>
-        <a:solidFill>
-          <a:srgbClr val="00518E"/>
-        </a:solidFill>
-        <a:effectLst/>
-      </p:bgPr>
-    </p:bg>
-    <p:spTree>
-      <p:nvGrpSpPr>
-        <p:cNvPr id="1" name=""/>
-        <p:cNvGrpSpPr/>
-        <p:nvPr/>
-      </p:nvGrpSpPr>
-      <p:grpSpPr>
-        <a:xfrm>
-          <a:off x="0" y="0"/>
-          <a:ext cx="0" cy="0"/>
-          <a:chOff x="0" y="0"/>
-          <a:chExt cx="0" cy="0"/>
-        </a:xfrm>
-      </p:grpSpPr>
-      <p:sp>
-        <p:nvSpPr>
-          <p:cNvPr id="2" name="Title 1"/>
-          <p:cNvSpPr>
-            <a:spLocks noGrp="1"/>
-          </p:cNvSpPr>
-          <p:nvPr>
-            <p:ph type="title"/>
-          </p:nvPr>
-        </p:nvSpPr>
-        <p:spPr/>
-        <p:txBody>
-          <a:bodyPr/>
-          <a:lstStyle/>
-          <a:p>
-            <a:r>
-              <a:rPr lang="en-US" dirty="0" smtClean="0"/>
-              <a:t>Windows Azure</a:t>
-            </a:r>
-            <a:endParaRPr lang="en-US" dirty="0"/>
-          </a:p>
-        </p:txBody>
-      </p:sp>
-      <p:sp>
-        <p:nvSpPr>
-          <p:cNvPr id="4" name="Slide Number Placeholder 3"/>
-          <p:cNvSpPr>
-            <a:spLocks noGrp="1"/>
-          </p:cNvSpPr>
-          <p:nvPr>
-            <p:ph type="sldNum" sz="quarter" idx="12"/>
-          </p:nvPr>
-        </p:nvSpPr>
-        <p:spPr/>
-        <p:txBody>
-          <a:bodyPr/>
-          <a:lstStyle/>
-          <a:p>
-            <a:fld id="{0A164282-434E-41D4-9582-783D542A7B68}" type="slidenum">
-              <a:rPr lang="en-US" smtClean="0"/>
-              <a:t>17</a:t>
-            </a:fld>
-            <a:endParaRPr lang="en-US"/>
-          </a:p>
-        </p:txBody>
-      </p:sp>
-      <p:sp>
-        <p:nvSpPr>
-          <p:cNvPr id="7" name="TextBox 6"/>
-          <p:cNvSpPr txBox="1"/>
-          <p:nvPr/>
-        </p:nvSpPr>
-        <p:spPr>
-          <a:xfrm>
-            <a:off x="871870" y="1871330"/>
-            <a:ext cx="3059171" cy="646331"/>
-          </a:xfrm>
-          <a:prstGeom prst="rect">
-            <a:avLst/>
-          </a:prstGeom>
-          <a:noFill/>
-        </p:spPr>
-        <p:txBody>
-          <a:bodyPr wrap="none" rtlCol="0">
-            <a:spAutoFit/>
-          </a:bodyPr>
-          <a:lstStyle/>
-          <a:p>
-            <a:r>
-              <a:rPr lang="en-US" sz="3600" dirty="0" smtClean="0">
-                <a:solidFill>
-                  <a:schemeClr val="bg1"/>
-                </a:solidFill>
-              </a:rPr>
-              <a:t>MSDN Credits</a:t>
-            </a:r>
-            <a:endParaRPr lang="en-US" sz="3600" dirty="0">
-              <a:solidFill>
-                <a:schemeClr val="bg1"/>
-              </a:solidFill>
-            </a:endParaRPr>
-          </a:p>
-        </p:txBody>
-      </p:sp>
-      <p:sp>
-        <p:nvSpPr>
-          <p:cNvPr id="8" name="TextBox 7"/>
-          <p:cNvSpPr txBox="1"/>
-          <p:nvPr/>
-        </p:nvSpPr>
-        <p:spPr>
-          <a:xfrm>
-            <a:off x="560798" y="4358498"/>
-            <a:ext cx="3160597" cy="1200329"/>
-          </a:xfrm>
-          <a:prstGeom prst="rect">
-            <a:avLst/>
-          </a:prstGeom>
-          <a:noFill/>
-        </p:spPr>
-        <p:txBody>
-          <a:bodyPr wrap="square" rtlCol="0">
-            <a:spAutoFit/>
-          </a:bodyPr>
-          <a:lstStyle/>
-          <a:p>
-            <a:r>
-              <a:rPr lang="en-US" dirty="0" smtClean="0"/>
-              <a:t>33% Discount on VMS</a:t>
-            </a:r>
-          </a:p>
-          <a:p>
-            <a:r>
-              <a:rPr lang="en-US" dirty="0" smtClean="0"/>
-              <a:t>25% Discount on Cloud Services, HD Insight &amp; Web Sites (Standard Mode)</a:t>
-            </a:r>
-            <a:endParaRPr lang="en-US" dirty="0"/>
-          </a:p>
-        </p:txBody>
-      </p:sp>
-      <p:sp>
-        <p:nvSpPr>
-          <p:cNvPr id="9" name="TextBox 8"/>
-          <p:cNvSpPr txBox="1"/>
-          <p:nvPr/>
-        </p:nvSpPr>
-        <p:spPr>
-          <a:xfrm>
-            <a:off x="531098" y="3028898"/>
-            <a:ext cx="3190297" cy="1107996"/>
-          </a:xfrm>
-          <a:prstGeom prst="rect">
-            <a:avLst/>
-          </a:prstGeom>
-          <a:noFill/>
-        </p:spPr>
-        <p:txBody>
-          <a:bodyPr wrap="none" rtlCol="0">
-            <a:spAutoFit/>
-          </a:bodyPr>
-          <a:lstStyle/>
-          <a:p>
-            <a:r>
-              <a:rPr lang="en-US" sz="6600" dirty="0" smtClean="0"/>
-              <a:t>33% Off</a:t>
-            </a:r>
-            <a:endParaRPr lang="en-US" sz="6600" dirty="0"/>
-          </a:p>
-        </p:txBody>
-      </p:sp>
-      <p:sp>
-        <p:nvSpPr>
-          <p:cNvPr id="10" name="TextBox 9"/>
-          <p:cNvSpPr txBox="1"/>
-          <p:nvPr/>
-        </p:nvSpPr>
-        <p:spPr>
-          <a:xfrm>
-            <a:off x="4505560" y="3006782"/>
-            <a:ext cx="3190297" cy="1107996"/>
-          </a:xfrm>
-          <a:prstGeom prst="rect">
-            <a:avLst/>
-          </a:prstGeom>
-          <a:noFill/>
-        </p:spPr>
-        <p:txBody>
-          <a:bodyPr wrap="none" rtlCol="0">
-            <a:spAutoFit/>
-          </a:bodyPr>
-          <a:lstStyle/>
-          <a:p>
-            <a:r>
-              <a:rPr lang="en-US" sz="6600" dirty="0" smtClean="0"/>
-              <a:t>25% Off</a:t>
-            </a:r>
-            <a:endParaRPr lang="en-US" sz="6600" dirty="0"/>
-          </a:p>
-        </p:txBody>
-      </p:sp>
-      <p:sp>
-        <p:nvSpPr>
-          <p:cNvPr id="11" name="TextBox 10"/>
-          <p:cNvSpPr txBox="1"/>
-          <p:nvPr/>
-        </p:nvSpPr>
-        <p:spPr>
-          <a:xfrm>
-            <a:off x="7082192" y="5671441"/>
-            <a:ext cx="4616648" cy="584775"/>
-          </a:xfrm>
-          <a:prstGeom prst="rect">
-            <a:avLst/>
-          </a:prstGeom>
-          <a:noFill/>
-        </p:spPr>
-        <p:txBody>
-          <a:bodyPr wrap="none" rtlCol="0">
-            <a:spAutoFit/>
-          </a:bodyPr>
-          <a:lstStyle/>
-          <a:p>
-            <a:r>
-              <a:rPr lang="en-US" sz="3200" dirty="0" smtClean="0"/>
-              <a:t>No Credit Card Required</a:t>
-            </a:r>
-            <a:endParaRPr lang="en-US" sz="3200" dirty="0"/>
-          </a:p>
-        </p:txBody>
-      </p:sp>
-      <p:sp>
-        <p:nvSpPr>
-          <p:cNvPr id="12" name="TextBox 11"/>
-          <p:cNvSpPr txBox="1"/>
-          <p:nvPr/>
-        </p:nvSpPr>
-        <p:spPr>
-          <a:xfrm>
-            <a:off x="8284029" y="3897086"/>
-            <a:ext cx="3409267" cy="1107996"/>
-          </a:xfrm>
-          <a:prstGeom prst="rect">
-            <a:avLst/>
-          </a:prstGeom>
-          <a:noFill/>
-        </p:spPr>
-        <p:txBody>
-          <a:bodyPr wrap="none" rtlCol="0">
-            <a:spAutoFit/>
-          </a:bodyPr>
-          <a:lstStyle/>
-          <a:p>
-            <a:r>
-              <a:rPr lang="en-US" sz="6600" dirty="0" err="1" smtClean="0"/>
-              <a:t>Dev</a:t>
-            </a:r>
-            <a:r>
-              <a:rPr lang="en-US" sz="6600" dirty="0" smtClean="0"/>
-              <a:t>-Test</a:t>
-            </a:r>
-            <a:endParaRPr lang="en-US" sz="6600" dirty="0"/>
-          </a:p>
-        </p:txBody>
-      </p:sp>
-    </p:spTree>
-    <p:extLst>
-      <p:ext uri="{BB962C8B-B14F-4D97-AF65-F5344CB8AC3E}">
-        <p14:creationId xmlns:p14="http://schemas.microsoft.com/office/powerpoint/2010/main" val="1396092782"/>
-      </p:ext>
-    </p:extLst>
-  </p:cSld>
-  <p:clrMapOvr>
-    <a:masterClrMapping/>
-  </p:clrMapOvr>
-  <p:timing>
-    <p:tnLst>
-      <p:par>
-        <p:cTn id="1" dur="indefinite" restart="never" nodeType="tmRoot"/>
-      </p:par>
-    </p:tnLst>
-  </p:timing>
-</p:sld>
-</file>
-
-<file path=ppt/slides/slide18.xml><?xml version="1.0" encoding="utf-8"?>
-<p:sld xmlns:a="http://schemas.openxmlformats.org/drawingml/2006/main" xmlns:r="http://schemas.openxmlformats.org/officeDocument/2006/relationships" xmlns:p="http://schemas.openxmlformats.org/presentationml/2006/main" show="0">
-  <p:cSld>
     <p:spTree>
       <p:nvGrpSpPr>
         <p:cNvPr id="1" name=""/>
@@ -22020,9 +21730,9 @@
         <p:grpSpPr>
           <a:xfrm>
             <a:off x="138727" y="263732"/>
-            <a:ext cx="3679529" cy="2609713"/>
+            <a:ext cx="3679529" cy="2941124"/>
             <a:chOff x="8411036" y="3864393"/>
-            <a:chExt cx="3753311" cy="2662043"/>
+            <a:chExt cx="3753311" cy="2663944"/>
           </a:xfrm>
         </p:grpSpPr>
         <p:sp>
@@ -22033,8 +21743,8 @@
           </p:nvSpPr>
           <p:spPr>
             <a:xfrm>
-              <a:off x="8615511" y="5818550"/>
-              <a:ext cx="3497263" cy="707886"/>
+              <a:off x="8615511" y="5818552"/>
+              <a:ext cx="3497263" cy="709785"/>
             </a:xfrm>
             <a:prstGeom prst="rect">
               <a:avLst/>
@@ -22048,39 +21758,36 @@
             <a:lstStyle/>
             <a:p>
               <a:r>
-                <a:rPr lang="en-US" sz="1961" b="1" dirty="0">
+                <a:rPr lang="en-US" sz="1961" b="1" dirty="0" smtClean="0">
                   <a:solidFill>
                     <a:srgbClr val="FFFFFF"/>
                   </a:solidFill>
                   <a:cs typeface="Segoe UI Light" panose="020B0502040204020203" pitchFamily="34" charset="0"/>
                 </a:rPr>
-                <a:t>FORTUNE 500 </a:t>
+                <a:t>DISCOUNT</a:t>
               </a:r>
-              <a:r>
-                <a:rPr lang="en-US" sz="1961" dirty="0">
+              <a:br>
+                <a:rPr lang="en-US" sz="1961" b="1" dirty="0" smtClean="0">
                   <a:solidFill>
                     <a:srgbClr val="FFFFFF"/>
                   </a:solidFill>
                   <a:cs typeface="Segoe UI Light" panose="020B0502040204020203" pitchFamily="34" charset="0"/>
                 </a:rPr>
-                <a:t>COMPANIES</a:t>
+              </a:br>
+              <a:r>
+                <a:rPr lang="en-US" sz="1961" dirty="0" smtClean="0">
+                  <a:solidFill>
+                    <a:srgbClr val="FFFFFF"/>
+                  </a:solidFill>
+                  <a:cs typeface="Segoe UI Light" panose="020B0502040204020203" pitchFamily="34" charset="0"/>
+                </a:rPr>
+                <a:t>VIRTUAL MACHINES</a:t>
               </a:r>
-              <a:endParaRPr lang="en-US" sz="2800" dirty="0">
+              <a:endParaRPr lang="en-US" sz="1961" dirty="0">
                 <a:solidFill>
                   <a:srgbClr val="FFFFFF"/>
                 </a:solidFill>
-                <a:cs typeface="Segoe UI Light" panose="020B0502040204020203" pitchFamily="34" charset="0"/>
               </a:endParaRPr>
-            </a:p>
-            <a:p>
-              <a:r>
-                <a:rPr lang="en-US" sz="1961" dirty="0">
-                  <a:solidFill>
-                    <a:srgbClr val="FFFFFF"/>
-                  </a:solidFill>
-                </a:rPr>
-                <a:t>USING WINDOWS AZURE</a:t>
-              </a:r>
             </a:p>
           </p:txBody>
         </p:sp>
@@ -22112,36 +21819,25 @@
                 <a:buSzPct val="90000"/>
               </a:pPr>
               <a:r>
-                <a:rPr lang="en-US" sz="13528" dirty="0">
+                <a:rPr lang="en-US" sz="13528" dirty="0" smtClean="0">
+                  <a:solidFill>
+                    <a:schemeClr val="bg1"/>
+                  </a:solidFill>
+                  <a:latin typeface="Segoe UI Light" panose="020B0502040204020203" pitchFamily="34" charset="0"/>
+                  <a:cs typeface="Segoe UI Light" panose="020B0502040204020203" pitchFamily="34" charset="0"/>
+                </a:rPr>
+                <a:t>33</a:t>
+              </a:r>
+              <a:r>
+                <a:rPr lang="en-US" sz="13600" dirty="0">
                   <a:solidFill>
                     <a:srgbClr val="11C1FF"/>
                   </a:solidFill>
                   <a:latin typeface="Segoe UI Light" panose="020B0502040204020203" pitchFamily="34" charset="0"/>
                   <a:cs typeface="Segoe UI Light" panose="020B0502040204020203" pitchFamily="34" charset="0"/>
                 </a:rPr>
-                <a:t>&gt;</a:t>
-              </a:r>
-              <a:r>
-                <a:rPr lang="en-US" sz="13528" dirty="0">
-                  <a:solidFill>
-                    <a:schemeClr val="bg1"/>
-                  </a:solidFill>
-                  <a:latin typeface="Segoe UI Light" panose="020B0502040204020203" pitchFamily="34" charset="0"/>
-                  <a:cs typeface="Segoe UI Light" panose="020B0502040204020203" pitchFamily="34" charset="0"/>
-                </a:rPr>
-                <a:t>50</a:t>
-              </a:r>
-              <a:r>
-                <a:rPr lang="en-US" sz="5882" dirty="0">
-                  <a:latin typeface="Segoe UI Light" panose="020B0502040204020203" pitchFamily="34" charset="0"/>
-                  <a:cs typeface="Segoe UI Light" panose="020B0502040204020203" pitchFamily="34" charset="0"/>
-                </a:rPr>
                 <a:t>%</a:t>
               </a:r>
-              <a:endParaRPr lang="en-US" sz="13528" dirty="0">
-                <a:latin typeface="Segoe UI Light" panose="020B0502040204020203" pitchFamily="34" charset="0"/>
-                <a:cs typeface="Segoe UI Light" panose="020B0502040204020203" pitchFamily="34" charset="0"/>
-              </a:endParaRPr>
             </a:p>
           </p:txBody>
         </p:sp>
@@ -22154,68 +21850,12 @@
         </p:nvGrpSpPr>
         <p:grpSpPr>
           <a:xfrm>
-            <a:off x="4419419" y="226804"/>
-            <a:ext cx="3534874" cy="2973485"/>
+            <a:off x="4419419" y="226803"/>
+            <a:ext cx="3534874" cy="2974136"/>
             <a:chOff x="4563187" y="3841057"/>
-            <a:chExt cx="3605756" cy="3033110"/>
+            <a:chExt cx="3605756" cy="2569844"/>
           </a:xfrm>
         </p:grpSpPr>
-        <p:sp>
-          <p:nvSpPr>
-            <p:cNvPr id="12" name="TextBox 11"/>
-            <p:cNvSpPr txBox="1"/>
-            <p:nvPr/>
-          </p:nvSpPr>
-          <p:spPr>
-            <a:xfrm>
-              <a:off x="4608585" y="6350947"/>
-              <a:ext cx="3497263" cy="523220"/>
-            </a:xfrm>
-            <a:prstGeom prst="rect">
-              <a:avLst/>
-            </a:prstGeom>
-            <a:noFill/>
-          </p:spPr>
-          <p:txBody>
-            <a:bodyPr wrap="square" rtlCol="0">
-              <a:spAutoFit/>
-            </a:bodyPr>
-            <a:lstStyle/>
-            <a:p>
-              <a:r>
-                <a:rPr lang="en-US" sz="1372" dirty="0">
-                  <a:solidFill>
-                    <a:srgbClr val="FFFFFF"/>
-                  </a:solidFill>
-                </a:rPr>
-                <a:t>ACTIVE DIRECTORY ACCOUNTS </a:t>
-              </a:r>
-              <a:br>
-                <a:rPr lang="en-US" sz="1372" dirty="0">
-                  <a:solidFill>
-                    <a:srgbClr val="FFFFFF"/>
-                  </a:solidFill>
-                </a:rPr>
-              </a:br>
-              <a:r>
-                <a:rPr lang="en-US" sz="1372" dirty="0">
-                  <a:solidFill>
-                    <a:srgbClr val="FFFFFF"/>
-                  </a:solidFill>
-                </a:rPr>
-                <a:t>WITH </a:t>
-              </a:r>
-              <a:r>
-                <a:rPr lang="en-US" sz="1372" b="1" dirty="0">
-                  <a:solidFill>
-                    <a:srgbClr val="FFFFFF"/>
-                  </a:solidFill>
-                </a:rPr>
-                <a:t>68 MILLION USERS</a:t>
-              </a:r>
-            </a:p>
-          </p:txBody>
-        </p:sp>
         <p:sp>
           <p:nvSpPr>
             <p:cNvPr id="51" name="Rectangle 50"/>
@@ -22244,15 +21884,32 @@
                 <a:buSzPct val="90000"/>
               </a:pPr>
               <a:r>
-                <a:rPr lang="en-US" sz="13528" dirty="0">
+                <a:rPr lang="en-US" sz="13528" dirty="0" smtClean="0">
                   <a:solidFill>
                     <a:schemeClr val="bg1"/>
                   </a:solidFill>
                   <a:latin typeface="Segoe UI Light" panose="020B0502040204020203" pitchFamily="34" charset="0"/>
                   <a:cs typeface="Segoe UI Light" panose="020B0502040204020203" pitchFamily="34" charset="0"/>
                 </a:rPr>
-                <a:t>3.2</a:t>
+                <a:t>25</a:t>
               </a:r>
+              <a:r>
+                <a:rPr lang="en-US" sz="13600" dirty="0">
+                  <a:solidFill>
+                    <a:srgbClr val="11C1FF"/>
+                  </a:solidFill>
+                  <a:latin typeface="Segoe UI Light" panose="020B0502040204020203" pitchFamily="34" charset="0"/>
+                  <a:cs typeface="Segoe UI Light" panose="020B0502040204020203" pitchFamily="34" charset="0"/>
+                </a:rPr>
+                <a:t>%</a:t>
+              </a:r>
+              <a:endParaRPr lang="en-US" sz="13600" dirty="0">
+                <a:solidFill>
+                  <a:srgbClr val="11C1FF"/>
+                </a:solidFill>
+                <a:latin typeface="Segoe UI Light" panose="020B0502040204020203" pitchFamily="34" charset="0"/>
+                <a:cs typeface="Segoe UI Light" panose="020B0502040204020203" pitchFamily="34" charset="0"/>
+              </a:endParaRPr>
             </a:p>
           </p:txBody>
         </p:sp>
@@ -22264,8 +21921,8 @@
           </p:nvSpPr>
           <p:spPr>
             <a:xfrm>
-              <a:off x="4597712" y="5660893"/>
-              <a:ext cx="2507617" cy="677108"/>
+              <a:off x="4597712" y="5587986"/>
+              <a:ext cx="3571231" cy="822915"/>
             </a:xfrm>
             <a:prstGeom prst="rect">
               <a:avLst/>
@@ -22290,7 +21947,7 @@
                   </a:solidFill>
                   <a:cs typeface="Segoe UI Light" panose="020B0502040204020203" pitchFamily="34" charset="0"/>
                 </a:rPr>
-                <a:t>MILLION </a:t>
+                <a:t>DISCOUNT</a:t>
               </a:r>
               <a:br>
                 <a:rPr lang="en-US" sz="1961" b="1" dirty="0">
@@ -22301,126 +21958,34 @@
                 </a:rPr>
               </a:br>
               <a:r>
-                <a:rPr lang="en-US" sz="1961" b="1" dirty="0">
+                <a:rPr lang="en-US" sz="1961" dirty="0" smtClean="0">
                   <a:solidFill>
                     <a:srgbClr val="FFFFFF"/>
                   </a:solidFill>
                   <a:cs typeface="Segoe UI Light" panose="020B0502040204020203" pitchFamily="34" charset="0"/>
                 </a:rPr>
-                <a:t>ORGANIZATIONS </a:t>
-              </a:r>
-              <a:endParaRPr lang="en-US" sz="2800" b="1" dirty="0">
-                <a:solidFill>
-                  <a:srgbClr val="FFFFFF"/>
-                </a:solidFill>
-                <a:cs typeface="Segoe UI Light" panose="020B0502040204020203" pitchFamily="34" charset="0"/>
-              </a:endParaRPr>
-            </a:p>
-          </p:txBody>
-        </p:sp>
-      </p:grpSp>
-      <p:grpSp>
-        <p:nvGrpSpPr>
-          <p:cNvPr id="4" name="Group 3"/>
-          <p:cNvGrpSpPr/>
-          <p:nvPr/>
-        </p:nvGrpSpPr>
-        <p:grpSpPr>
-          <a:xfrm>
-            <a:off x="8343269" y="-17491"/>
-            <a:ext cx="3599748" cy="3222347"/>
-            <a:chOff x="4389046" y="190012"/>
-            <a:chExt cx="3671930" cy="3286962"/>
-          </a:xfrm>
-        </p:grpSpPr>
-        <p:sp>
-          <p:nvSpPr>
-            <p:cNvPr id="25" name="Rectangle 24"/>
-            <p:cNvSpPr/>
-            <p:nvPr/>
-          </p:nvSpPr>
-          <p:spPr>
-            <a:xfrm>
-              <a:off x="4389046" y="190012"/>
-              <a:ext cx="3671930" cy="3001591"/>
-            </a:xfrm>
-            <a:prstGeom prst="rect">
-              <a:avLst/>
-            </a:prstGeom>
-          </p:spPr>
-          <p:txBody>
-            <a:bodyPr wrap="square" anchor="b">
-              <a:spAutoFit/>
-            </a:bodyPr>
-            <a:lstStyle/>
-            <a:p>
-              <a:pPr>
-                <a:lnSpc>
-                  <a:spcPct val="95000"/>
-                </a:lnSpc>
-                <a:buSzPct val="90000"/>
-              </a:pPr>
-              <a:r>
-                <a:rPr lang="en-US" sz="19508" dirty="0">
-                  <a:solidFill>
-                    <a:schemeClr val="bg1"/>
-                  </a:solidFill>
-                  <a:latin typeface="Segoe UI Light" panose="020B0502040204020203" pitchFamily="34" charset="0"/>
-                  <a:cs typeface="Segoe UI Light" panose="020B0502040204020203" pitchFamily="34" charset="0"/>
-                </a:rPr>
-                <a:t>2</a:t>
+                <a:t>RESERVED </a:t>
               </a:r>
               <a:r>
-                <a:rPr lang="en-US" sz="13600" dirty="0">
-                  <a:solidFill>
-                    <a:srgbClr val="11C1FF"/>
-                  </a:solidFill>
-                  <a:latin typeface="Segoe UI Light" panose="020B0502040204020203" pitchFamily="34" charset="0"/>
-                  <a:cs typeface="Segoe UI Light" panose="020B0502040204020203" pitchFamily="34" charset="0"/>
-                </a:rPr>
-                <a:t>x</a:t>
-              </a:r>
-            </a:p>
-          </p:txBody>
-        </p:sp>
-        <p:sp>
-          <p:nvSpPr>
-            <p:cNvPr id="26" name="Rectangle 25"/>
-            <p:cNvSpPr/>
-            <p:nvPr/>
-          </p:nvSpPr>
-          <p:spPr>
-            <a:xfrm>
-              <a:off x="4467080" y="2975298"/>
-              <a:ext cx="3532108" cy="501676"/>
-            </a:xfrm>
-            <a:prstGeom prst="rect">
-              <a:avLst/>
-            </a:prstGeom>
-          </p:spPr>
-          <p:txBody>
-            <a:bodyPr wrap="square" anchor="ctr">
-              <a:spAutoFit/>
-            </a:bodyPr>
-            <a:lstStyle/>
-            <a:p>
-              <a:pPr>
-                <a:lnSpc>
-                  <a:spcPct val="95000"/>
-                </a:lnSpc>
-                <a:buSzPct val="90000"/>
-              </a:pPr>
-              <a:r>
-                <a:rPr lang="en-US" sz="1372" dirty="0">
+                <a:rPr lang="en-US" sz="1961" dirty="0">
                   <a:solidFill>
                     <a:srgbClr val="FFFFFF"/>
                   </a:solidFill>
                   <a:cs typeface="Segoe UI Light" panose="020B0502040204020203" pitchFamily="34" charset="0"/>
                 </a:rPr>
-                <a:t>COMPUTE + STORAGE </a:t>
+                <a:t>WEB </a:t>
+              </a:r>
+              <a:r>
+                <a:rPr lang="en-US" sz="1961" dirty="0" smtClean="0">
+                  <a:solidFill>
+                    <a:srgbClr val="FFFFFF"/>
+                  </a:solidFill>
+                  <a:cs typeface="Segoe UI Light" panose="020B0502040204020203" pitchFamily="34" charset="0"/>
+                </a:rPr>
+                <a:t>SITES</a:t>
               </a:r>
               <a:br>
-                <a:rPr lang="en-US" sz="1372" dirty="0">
+                <a:rPr lang="en-US" sz="1961" dirty="0" smtClean="0">
                   <a:solidFill>
                     <a:srgbClr val="FFFFFF"/>
                   </a:solidFill>
@@ -22428,24 +21993,15 @@
                 </a:rPr>
               </a:br>
               <a:r>
-                <a:rPr lang="en-US" sz="1372" dirty="0">
+                <a:rPr lang="en-US" sz="1961" dirty="0" smtClean="0">
                   <a:solidFill>
                     <a:srgbClr val="FFFFFF"/>
                   </a:solidFill>
                   <a:cs typeface="Segoe UI Light" panose="020B0502040204020203" pitchFamily="34" charset="0"/>
                 </a:rPr>
-                <a:t>EVERY </a:t>
+                <a:t>CLOUD SERVICES, HDINSIGHT</a:t>
               </a:r>
-              <a:r>
-                <a:rPr lang="en-US" sz="1372" b="1" dirty="0">
-                  <a:solidFill>
-                    <a:srgbClr val="FFFFFF"/>
-                  </a:solidFill>
-                  <a:cs typeface="Segoe UI Light" panose="020B0502040204020203" pitchFamily="34" charset="0"/>
-                </a:rPr>
-                <a:t>6 MONTHS</a:t>
-              </a:r>
-              <a:endParaRPr lang="en-US" sz="1961" b="1" dirty="0">
+              <a:endParaRPr lang="en-US" sz="1961" dirty="0">
                 <a:solidFill>
                   <a:srgbClr val="FFFFFF"/>
                 </a:solidFill>
@@ -22562,78 +22118,28 @@
       </p:cxnSp>
       <p:grpSp>
         <p:nvGrpSpPr>
-          <p:cNvPr id="17" name="Group 16"/>
+          <p:cNvPr id="44" name="Group 43"/>
           <p:cNvGrpSpPr/>
           <p:nvPr/>
         </p:nvGrpSpPr>
         <p:grpSpPr>
           <a:xfrm>
-            <a:off x="8304719" y="3671083"/>
-            <a:ext cx="3778034" cy="2942586"/>
-            <a:chOff x="137652" y="3609604"/>
-            <a:chExt cx="3853791" cy="3001591"/>
+            <a:off x="208050" y="3468689"/>
+            <a:ext cx="3679529" cy="2895745"/>
+            <a:chOff x="8411036" y="3977051"/>
+            <a:chExt cx="3753311" cy="2622841"/>
           </a:xfrm>
         </p:grpSpPr>
         <p:sp>
           <p:nvSpPr>
-            <p:cNvPr id="36" name="Rectangle 35"/>
-            <p:cNvSpPr/>
-            <p:nvPr/>
-          </p:nvSpPr>
-          <p:spPr>
-            <a:xfrm>
-              <a:off x="137652" y="3609604"/>
-              <a:ext cx="3853791" cy="3001591"/>
-            </a:xfrm>
-            <a:prstGeom prst="rect">
-              <a:avLst/>
-            </a:prstGeom>
-          </p:spPr>
-          <p:txBody>
-            <a:bodyPr wrap="square" anchor="ctr">
-              <a:spAutoFit/>
-            </a:bodyPr>
-            <a:lstStyle/>
-            <a:p>
-              <a:pPr>
-                <a:lnSpc>
-                  <a:spcPct val="95000"/>
-                </a:lnSpc>
-                <a:buSzPct val="90000"/>
-              </a:pPr>
-              <a:r>
-                <a:rPr lang="en-US" sz="19508" dirty="0">
-                  <a:solidFill>
-                    <a:schemeClr val="bg1"/>
-                  </a:solidFill>
-                  <a:latin typeface="Segoe UI Light" panose="020B0502040204020203" pitchFamily="34" charset="0"/>
-                  <a:cs typeface="Segoe UI Light" panose="020B0502040204020203" pitchFamily="34" charset="0"/>
-                </a:rPr>
-                <a:t>3</a:t>
-              </a:r>
-              <a:r>
-                <a:rPr lang="en-US" sz="13600" dirty="0">
-                  <a:solidFill>
-                    <a:srgbClr val="11C1FF"/>
-                  </a:solidFill>
-                  <a:latin typeface="Segoe UI Light" panose="020B0502040204020203" pitchFamily="34" charset="0"/>
-                  <a:cs typeface="Segoe UI Light" panose="020B0502040204020203" pitchFamily="34" charset="0"/>
-                </a:rPr>
-                <a:t>x</a:t>
-              </a:r>
-            </a:p>
-          </p:txBody>
-        </p:sp>
-        <p:sp>
-          <p:nvSpPr>
-            <p:cNvPr id="11" name="TextBox 10"/>
+            <p:cNvPr id="45" name="TextBox 44"/>
             <p:cNvSpPr txBox="1"/>
             <p:nvPr/>
           </p:nvSpPr>
           <p:spPr>
             <a:xfrm>
-              <a:off x="269764" y="6177069"/>
-              <a:ext cx="3497263" cy="307777"/>
+              <a:off x="8655806" y="5696326"/>
+              <a:ext cx="3497263" cy="903566"/>
             </a:xfrm>
             <a:prstGeom prst="rect">
               <a:avLst/>
@@ -22647,316 +22153,78 @@
             <a:lstStyle/>
             <a:p>
               <a:r>
-                <a:rPr lang="en-US" sz="1372" dirty="0">
+                <a:rPr lang="en-US" sz="1961" b="1" dirty="0" smtClean="0">
                   <a:solidFill>
                     <a:srgbClr val="FFFFFF"/>
                   </a:solidFill>
+                  <a:cs typeface="Segoe UI Light" panose="020B0502040204020203" pitchFamily="34" charset="0"/>
                 </a:rPr>
-                <a:t>GROWTH IN </a:t>
+                <a:t>MONTHLY CREDIT</a:t>
               </a:r>
+            </a:p>
+            <a:p>
               <a:r>
-                <a:rPr lang="en-US" sz="1372" b="1" dirty="0">
+                <a:rPr lang="en-US" sz="1961" dirty="0" smtClean="0">
                   <a:solidFill>
                     <a:srgbClr val="FFFFFF"/>
                   </a:solidFill>
+                  <a:cs typeface="Segoe UI Light" panose="020B0502040204020203" pitchFamily="34" charset="0"/>
                 </a:rPr>
-                <a:t>HYPER-V</a:t>
+                <a:t>VISUAL STUDIO </a:t>
               </a:r>
               <a:r>
-                <a:rPr lang="en-US" sz="1372" dirty="0">
+                <a:rPr lang="en-US" sz="1961" b="1" dirty="0" smtClean="0">
                   <a:solidFill>
                     <a:srgbClr val="FFFFFF"/>
                   </a:solidFill>
+                  <a:cs typeface="Segoe UI Light" panose="020B0502040204020203" pitchFamily="34" charset="0"/>
                 </a:rPr>
-                <a:t> SHARE</a:t>
+                <a:t>ULTIMATE</a:t>
               </a:r>
-            </a:p>
-          </p:txBody>
-        </p:sp>
-      </p:grpSp>
-      <p:grpSp>
-        <p:nvGrpSpPr>
-          <p:cNvPr id="29" name="Group 28"/>
-          <p:cNvGrpSpPr/>
-          <p:nvPr/>
-        </p:nvGrpSpPr>
-        <p:grpSpPr>
-          <a:xfrm>
-            <a:off x="4205222" y="3956067"/>
-            <a:ext cx="3781639" cy="2139212"/>
-            <a:chOff x="4261875" y="1353644"/>
-            <a:chExt cx="3671930" cy="2182108"/>
-          </a:xfrm>
-        </p:grpSpPr>
-        <p:sp>
-          <p:nvSpPr>
-            <p:cNvPr id="33" name="TextBox 32"/>
-            <p:cNvSpPr txBox="1"/>
-            <p:nvPr/>
-          </p:nvSpPr>
-          <p:spPr>
-            <a:xfrm>
-              <a:off x="4413019" y="2917563"/>
-              <a:ext cx="3497263" cy="307777"/>
-            </a:xfrm>
-            <a:prstGeom prst="rect">
-              <a:avLst/>
-            </a:prstGeom>
-            <a:noFill/>
-          </p:spPr>
-          <p:txBody>
-            <a:bodyPr wrap="square" rtlCol="0">
-              <a:spAutoFit/>
-            </a:bodyPr>
-            <a:lstStyle/>
-            <a:p>
               <a:r>
-                <a:rPr lang="en-US" sz="1372" b="1" dirty="0">
+                <a:rPr lang="en-US" sz="1961" dirty="0" smtClean="0">
                   <a:solidFill>
                     <a:srgbClr val="FFFFFF"/>
                   </a:solidFill>
-                </a:rPr>
-                <a:t>STORAGE TRANSACTIONS PER SECOND</a:t>
-              </a:r>
-            </a:p>
-          </p:txBody>
-        </p:sp>
-        <p:sp>
-          <p:nvSpPr>
-            <p:cNvPr id="34" name="Rectangle 33"/>
-            <p:cNvSpPr/>
-            <p:nvPr/>
-          </p:nvSpPr>
-          <p:spPr>
-            <a:xfrm>
-              <a:off x="4261875" y="1353644"/>
-              <a:ext cx="3671930" cy="1773562"/>
-            </a:xfrm>
-            <a:prstGeom prst="rect">
-              <a:avLst/>
-            </a:prstGeom>
-          </p:spPr>
-          <p:txBody>
-            <a:bodyPr wrap="square" anchor="b">
-              <a:spAutoFit/>
-            </a:bodyPr>
-            <a:lstStyle/>
-            <a:p>
-              <a:pPr algn="ctr">
-                <a:lnSpc>
-                  <a:spcPct val="95000"/>
-                </a:lnSpc>
-                <a:buSzPct val="90000"/>
-              </a:pPr>
-              <a:r>
-                <a:rPr lang="en-US" sz="11273" spc="-294" dirty="0">
-                  <a:solidFill>
-                    <a:schemeClr val="bg1"/>
-                  </a:solidFill>
-                  <a:latin typeface="Segoe UI Light" panose="020B0502040204020203" pitchFamily="34" charset="0"/>
                   <a:cs typeface="Segoe UI Light" panose="020B0502040204020203" pitchFamily="34" charset="0"/>
                 </a:rPr>
-                <a:t>900</a:t>
+                <a:t/>
               </a:r>
-              <a:r>
-                <a:rPr lang="en-US" sz="11273" spc="-294" dirty="0">
+              <a:br>
+                <a:rPr lang="en-US" sz="1961" dirty="0" smtClean="0">
                   <a:solidFill>
-                    <a:srgbClr val="11C1FF"/>
+                    <a:srgbClr val="FFFFFF"/>
                   </a:solidFill>
-                  <a:latin typeface="Segoe UI Light" panose="020B0502040204020203" pitchFamily="34" charset="0"/>
                   <a:cs typeface="Segoe UI Light" panose="020B0502040204020203" pitchFamily="34" charset="0"/>
                 </a:rPr>
-                <a:t>k</a:t>
-              </a:r>
+              </a:br>
               <a:r>
-                <a:rPr lang="en-US" sz="3921" dirty="0">
+                <a:rPr lang="en-US" sz="1961" dirty="0" smtClean="0">
                   <a:solidFill>
-                    <a:srgbClr val="11C1FF"/>
+                    <a:srgbClr val="FFFFFF"/>
                   </a:solidFill>
-                  <a:latin typeface="Segoe UI Light" panose="020B0502040204020203" pitchFamily="34" charset="0"/>
                   <a:cs typeface="Segoe UI Light" panose="020B0502040204020203" pitchFamily="34" charset="0"/>
                 </a:rPr>
-                <a:t>/sec</a:t>
+                <a:t>WITH MSDN</a:t>
               </a:r>
-              <a:endParaRPr lang="en-US" sz="9411" dirty="0">
+              <a:endParaRPr lang="en-US" sz="1961" dirty="0">
                 <a:solidFill>
-                  <a:srgbClr val="11C1FF"/>
+                  <a:srgbClr val="FFFFFF"/>
                 </a:solidFill>
-                <a:latin typeface="Segoe UI Light" panose="020B0502040204020203" pitchFamily="34" charset="0"/>
-                <a:cs typeface="Segoe UI Light" panose="020B0502040204020203" pitchFamily="34" charset="0"/>
               </a:endParaRPr>
             </a:p>
           </p:txBody>
         </p:sp>
         <p:sp>
           <p:nvSpPr>
-            <p:cNvPr id="35" name="Rectangle 34"/>
+            <p:cNvPr id="46" name="Rectangle 45"/>
             <p:cNvSpPr/>
             <p:nvPr/>
           </p:nvSpPr>
           <p:spPr>
             <a:xfrm>
-              <a:off x="4413019" y="3238748"/>
-              <a:ext cx="2627706" cy="297004"/>
-            </a:xfrm>
-            <a:prstGeom prst="rect">
-              <a:avLst/>
-            </a:prstGeom>
-          </p:spPr>
-          <p:txBody>
-            <a:bodyPr wrap="square" anchor="ctr">
-              <a:spAutoFit/>
-            </a:bodyPr>
-            <a:lstStyle/>
-            <a:p>
-              <a:pPr>
-                <a:lnSpc>
-                  <a:spcPct val="95000"/>
-                </a:lnSpc>
-                <a:buSzPct val="90000"/>
-              </a:pPr>
-              <a:r>
-                <a:rPr lang="en-US" sz="1372" dirty="0">
-                  <a:solidFill>
-                    <a:srgbClr val="FFFFFF"/>
-                  </a:solidFill>
-                  <a:cs typeface="Segoe UI Light" panose="020B0502040204020203" pitchFamily="34" charset="0"/>
-                </a:rPr>
-                <a:t>(2 </a:t>
-              </a:r>
-              <a:r>
-                <a:rPr lang="en-US" sz="1372" i="1" dirty="0">
-                  <a:solidFill>
-                    <a:srgbClr val="FFFFFF"/>
-                  </a:solidFill>
-                  <a:cs typeface="Segoe UI Light" panose="020B0502040204020203" pitchFamily="34" charset="0"/>
-                </a:rPr>
-                <a:t>TRILLION</a:t>
-              </a:r>
-              <a:r>
-                <a:rPr lang="en-US" sz="1372" dirty="0">
-                  <a:solidFill>
-                    <a:srgbClr val="FFFFFF"/>
-                  </a:solidFill>
-                  <a:cs typeface="Segoe UI Light" panose="020B0502040204020203" pitchFamily="34" charset="0"/>
-                </a:rPr>
-                <a:t>/MONTH)</a:t>
-              </a:r>
-              <a:endParaRPr lang="en-US" sz="1961" dirty="0">
-                <a:solidFill>
-                  <a:srgbClr val="FFFFFF"/>
-                </a:solidFill>
-                <a:cs typeface="Segoe UI Light" panose="020B0502040204020203" pitchFamily="34" charset="0"/>
-              </a:endParaRPr>
-            </a:p>
-          </p:txBody>
-        </p:sp>
-      </p:grpSp>
-      <p:grpSp>
-        <p:nvGrpSpPr>
-          <p:cNvPr id="5" name="Group 4"/>
-          <p:cNvGrpSpPr/>
-          <p:nvPr/>
-        </p:nvGrpSpPr>
-        <p:grpSpPr>
-          <a:xfrm>
-            <a:off x="228133" y="3688555"/>
-            <a:ext cx="3322443" cy="2942586"/>
-            <a:chOff x="232706" y="3762021"/>
-            <a:chExt cx="3389065" cy="3001591"/>
-          </a:xfrm>
-        </p:grpSpPr>
-        <p:sp>
-          <p:nvSpPr>
-            <p:cNvPr id="20" name="Rectangle 19"/>
-            <p:cNvSpPr/>
-            <p:nvPr/>
-          </p:nvSpPr>
-          <p:spPr>
-            <a:xfrm>
-              <a:off x="232706" y="3762021"/>
-              <a:ext cx="1961025" cy="3001591"/>
-            </a:xfrm>
-            <a:prstGeom prst="rect">
-              <a:avLst/>
-            </a:prstGeom>
-          </p:spPr>
-          <p:txBody>
-            <a:bodyPr wrap="square" anchor="b">
-              <a:spAutoFit/>
-            </a:bodyPr>
-            <a:lstStyle/>
-            <a:p>
-              <a:pPr algn="ctr">
-                <a:lnSpc>
-                  <a:spcPct val="95000"/>
-                </a:lnSpc>
-                <a:buSzPct val="90000"/>
-              </a:pPr>
-              <a:r>
-                <a:rPr lang="en-US" sz="19508" spc="-294" dirty="0">
-                  <a:solidFill>
-                    <a:schemeClr val="bg1"/>
-                  </a:solidFill>
-                  <a:latin typeface="Segoe UI Light" panose="020B0502040204020203" pitchFamily="34" charset="0"/>
-                  <a:cs typeface="Segoe UI Light" panose="020B0502040204020203" pitchFamily="34" charset="0"/>
-                </a:rPr>
-                <a:t>8</a:t>
-              </a:r>
-              <a:endParaRPr lang="en-US" sz="9411" spc="-294" dirty="0">
-                <a:solidFill>
-                  <a:schemeClr val="bg1"/>
-                </a:solidFill>
-                <a:latin typeface="Segoe UI Light" panose="020B0502040204020203" pitchFamily="34" charset="0"/>
-                <a:cs typeface="Segoe UI Light" panose="020B0502040204020203" pitchFamily="34" charset="0"/>
-              </a:endParaRPr>
-            </a:p>
-          </p:txBody>
-        </p:sp>
-        <p:sp>
-          <p:nvSpPr>
-            <p:cNvPr id="30" name="TextBox 29"/>
-            <p:cNvSpPr txBox="1"/>
-            <p:nvPr/>
-          </p:nvSpPr>
-          <p:spPr>
-            <a:xfrm>
-              <a:off x="608626" y="6292972"/>
-              <a:ext cx="2313382" cy="369332"/>
-            </a:xfrm>
-            <a:prstGeom prst="rect">
-              <a:avLst/>
-            </a:prstGeom>
-            <a:noFill/>
-          </p:spPr>
-          <p:txBody>
-            <a:bodyPr wrap="square" rtlCol="0">
-              <a:spAutoFit/>
-            </a:bodyPr>
-            <a:lstStyle/>
-            <a:p>
-              <a:pPr algn="ctr"/>
-              <a:r>
-                <a:rPr lang="en-US" sz="1765" dirty="0">
-                  <a:solidFill>
-                    <a:srgbClr val="FFFFFF"/>
-                  </a:solidFill>
-                </a:rPr>
-                <a:t>STORAGE OBJECTS</a:t>
-              </a:r>
-            </a:p>
-          </p:txBody>
-        </p:sp>
-        <p:sp>
-          <p:nvSpPr>
-            <p:cNvPr id="37" name="Rectangle 36"/>
-            <p:cNvSpPr/>
-            <p:nvPr/>
-          </p:nvSpPr>
-          <p:spPr>
-            <a:xfrm rot="16200000">
-              <a:off x="2506137" y="4835778"/>
-              <a:ext cx="1788069" cy="443198"/>
+              <a:off x="8411036" y="3977051"/>
+              <a:ext cx="3753311" cy="1884491"/>
             </a:xfrm>
             <a:prstGeom prst="rect">
               <a:avLst/>
@@ -22975,40 +22243,101 @@
                 <a:buSzPct val="90000"/>
               </a:pPr>
               <a:r>
-                <a:rPr lang="en-US" sz="2353" b="1" dirty="0">
+                <a:rPr lang="en-US" sz="13600" dirty="0" smtClean="0">
                   <a:solidFill>
                     <a:srgbClr val="11C1FF"/>
                   </a:solidFill>
+                  <a:latin typeface="Segoe UI Light" panose="020B0502040204020203" pitchFamily="34" charset="0"/>
                   <a:cs typeface="Segoe UI Light" panose="020B0502040204020203" pitchFamily="34" charset="0"/>
                 </a:rPr>
-                <a:t>TRILLION</a:t>
+                <a:t>$</a:t>
               </a:r>
-              <a:endParaRPr lang="en-US" sz="3137" b="1" dirty="0">
+              <a:r>
+                <a:rPr lang="en-US" sz="13600" dirty="0" smtClean="0">
+                  <a:solidFill>
+                    <a:schemeClr val="bg1"/>
+                  </a:solidFill>
+                  <a:latin typeface="Segoe UI Light" panose="020B0502040204020203" pitchFamily="34" charset="0"/>
+                  <a:cs typeface="Segoe UI Light" panose="020B0502040204020203" pitchFamily="34" charset="0"/>
+                </a:rPr>
+                <a:t>150</a:t>
+              </a:r>
+              <a:endParaRPr lang="en-US" sz="13600" dirty="0">
                 <a:solidFill>
-                  <a:srgbClr val="11C1FF"/>
+                  <a:schemeClr val="bg1"/>
                 </a:solidFill>
+                <a:latin typeface="Segoe UI Light" panose="020B0502040204020203" pitchFamily="34" charset="0"/>
                 <a:cs typeface="Segoe UI Light" panose="020B0502040204020203" pitchFamily="34" charset="0"/>
               </a:endParaRPr>
             </a:p>
           </p:txBody>
         </p:sp>
+      </p:grpSp>
+      <p:grpSp>
+        <p:nvGrpSpPr>
+          <p:cNvPr id="47" name="Group 46"/>
+          <p:cNvGrpSpPr/>
+          <p:nvPr/>
+        </p:nvGrpSpPr>
+        <p:grpSpPr>
+          <a:xfrm>
+            <a:off x="8450655" y="297561"/>
+            <a:ext cx="3679529" cy="2427189"/>
+            <a:chOff x="8411036" y="3977051"/>
+            <a:chExt cx="3753311" cy="2198444"/>
+          </a:xfrm>
+        </p:grpSpPr>
         <p:sp>
           <p:nvSpPr>
-            <p:cNvPr id="38" name="Rectangle 37"/>
+            <p:cNvPr id="48" name="TextBox 47"/>
+            <p:cNvSpPr txBox="1"/>
+            <p:nvPr/>
+          </p:nvSpPr>
+          <p:spPr>
+            <a:xfrm>
+              <a:off x="8615511" y="5818552"/>
+              <a:ext cx="3497263" cy="356943"/>
+            </a:xfrm>
+            <a:prstGeom prst="rect">
+              <a:avLst/>
+            </a:prstGeom>
+            <a:noFill/>
+          </p:spPr>
+          <p:txBody>
+            <a:bodyPr wrap="square" rtlCol="0">
+              <a:spAutoFit/>
+            </a:bodyPr>
+            <a:lstStyle/>
+            <a:p>
+              <a:r>
+                <a:rPr lang="en-US" sz="1961" b="1" dirty="0" smtClean="0">
+                  <a:solidFill>
+                    <a:srgbClr val="FFFFFF"/>
+                  </a:solidFill>
+                  <a:cs typeface="Segoe UI Light" panose="020B0502040204020203" pitchFamily="34" charset="0"/>
+                </a:rPr>
+                <a:t>CREDIT CARD REQUIRED</a:t>
+              </a:r>
+            </a:p>
+          </p:txBody>
+        </p:sp>
+        <p:sp>
+          <p:nvSpPr>
+            <p:cNvPr id="49" name="Rectangle 48"/>
             <p:cNvSpPr/>
             <p:nvPr/>
           </p:nvSpPr>
           <p:spPr>
             <a:xfrm>
-              <a:off x="1675426" y="3762021"/>
-              <a:ext cx="1850094" cy="3001591"/>
+              <a:off x="8411036" y="3977051"/>
+              <a:ext cx="3753311" cy="1884491"/>
             </a:xfrm>
             <a:prstGeom prst="rect">
               <a:avLst/>
             </a:prstGeom>
           </p:spPr>
           <p:txBody>
-            <a:bodyPr wrap="square" anchor="b">
+            <a:bodyPr wrap="square" anchor="ctr">
               <a:spAutoFit/>
             </a:bodyPr>
             <a:lstStyle/>
@@ -23020,16 +22349,16 @@
                 <a:buSzPct val="90000"/>
               </a:pPr>
               <a:r>
-                <a:rPr lang="en-US" sz="19508" spc="-294" dirty="0">
+                <a:rPr lang="en-US" sz="13600" dirty="0" smtClean="0">
                   <a:solidFill>
                     <a:schemeClr val="bg1"/>
                   </a:solidFill>
                   <a:latin typeface="Segoe UI Light" panose="020B0502040204020203" pitchFamily="34" charset="0"/>
                   <a:cs typeface="Segoe UI Light" panose="020B0502040204020203" pitchFamily="34" charset="0"/>
                 </a:rPr>
-                <a:t>5</a:t>
+                <a:t>NO</a:t>
               </a:r>
-              <a:endParaRPr lang="en-US" sz="9411" spc="-294" dirty="0">
+              <a:endParaRPr lang="en-US" sz="13600" dirty="0">
                 <a:solidFill>
                   <a:schemeClr val="bg1"/>
                 </a:solidFill>
@@ -23039,174 +22368,299 @@
             </a:p>
           </p:txBody>
         </p:sp>
+      </p:grpSp>
+      <p:grpSp>
+        <p:nvGrpSpPr>
+          <p:cNvPr id="58" name="Group 57"/>
+          <p:cNvGrpSpPr/>
+          <p:nvPr/>
+        </p:nvGrpSpPr>
+        <p:grpSpPr>
+          <a:xfrm>
+            <a:off x="4229940" y="3429001"/>
+            <a:ext cx="3690585" cy="2935434"/>
+            <a:chOff x="8411036" y="3977051"/>
+            <a:chExt cx="3764589" cy="2658790"/>
+          </a:xfrm>
+        </p:grpSpPr>
         <p:sp>
           <p:nvSpPr>
-            <p:cNvPr id="2" name="Oval 1"/>
-            <p:cNvSpPr/>
+            <p:cNvPr id="59" name="TextBox 58"/>
+            <p:cNvSpPr txBox="1"/>
             <p:nvPr/>
           </p:nvSpPr>
-          <p:spPr bwMode="auto">
+          <p:spPr>
             <a:xfrm>
-              <a:off x="1798826" y="5928878"/>
-              <a:ext cx="217922" cy="217922"/>
+              <a:off x="8678362" y="5732275"/>
+              <a:ext cx="3497263" cy="903566"/>
             </a:xfrm>
-            <a:prstGeom prst="ellipse">
+            <a:prstGeom prst="rect">
               <a:avLst/>
             </a:prstGeom>
-            <a:solidFill>
-              <a:schemeClr val="tx1"/>
-            </a:solidFill>
-            <a:ln>
-              <a:noFill/>
-              <a:headEnd type="none" w="med" len="med"/>
-              <a:tailEnd type="none" w="med" len="med"/>
-            </a:ln>
-            <a:effectLst/>
+            <a:noFill/>
           </p:spPr>
-          <p:style>
-            <a:lnRef idx="1">
-              <a:schemeClr val="accent2"/>
-            </a:lnRef>
-            <a:fillRef idx="3">
-              <a:schemeClr val="accent2"/>
-            </a:fillRef>
-            <a:effectRef idx="2">
-              <a:schemeClr val="accent2"/>
-            </a:effectRef>
-            <a:fontRef idx="minor">
-              <a:schemeClr val="lt1"/>
-            </a:fontRef>
-          </p:style>
           <p:txBody>
-            <a:bodyPr lIns="89642" tIns="89642" rIns="33620" bIns="33620" rtlCol="0" anchor="t" anchorCtr="0"/>
+            <a:bodyPr wrap="square" rtlCol="0">
+              <a:spAutoFit/>
+            </a:bodyPr>
             <a:lstStyle/>
             <a:p>
-              <a:pPr algn="ctr" defTabSz="914038"/>
-              <a:endParaRPr lang="en-US" sz="1568" spc="-100" dirty="0">
-                <a:gradFill>
-                  <a:gsLst>
-                    <a:gs pos="0">
-                      <a:srgbClr val="FFFFFF"/>
-                    </a:gs>
-                    <a:gs pos="100000">
-                      <a:srgbClr val="FFFFFF"/>
-                    </a:gs>
-                  </a:gsLst>
-                  <a:lin ang="5400000" scaled="0"/>
-                </a:gradFill>
-                <a:ea typeface="Segoe UI" pitchFamily="34" charset="0"/>
-                <a:cs typeface="Segoe UI" pitchFamily="34" charset="0"/>
+              <a:r>
+                <a:rPr lang="en-US" sz="1961" b="1" dirty="0" smtClean="0">
+                  <a:solidFill>
+                    <a:srgbClr val="FFFFFF"/>
+                  </a:solidFill>
+                  <a:cs typeface="Segoe UI Light" panose="020B0502040204020203" pitchFamily="34" charset="0"/>
+                </a:rPr>
+                <a:t>MONTHLY CREDIT</a:t>
+              </a:r>
+            </a:p>
+            <a:p>
+              <a:r>
+                <a:rPr lang="en-US" sz="1961" dirty="0" smtClean="0">
+                  <a:solidFill>
+                    <a:srgbClr val="FFFFFF"/>
+                  </a:solidFill>
+                  <a:cs typeface="Segoe UI Light" panose="020B0502040204020203" pitchFamily="34" charset="0"/>
+                </a:rPr>
+                <a:t>VISUAL STUDIO </a:t>
+              </a:r>
+              <a:r>
+                <a:rPr lang="en-US" sz="1961" b="1" dirty="0" smtClean="0">
+                  <a:solidFill>
+                    <a:srgbClr val="FFFFFF"/>
+                  </a:solidFill>
+                  <a:cs typeface="Segoe UI Light" panose="020B0502040204020203" pitchFamily="34" charset="0"/>
+                </a:rPr>
+                <a:t>PREMIUM</a:t>
+              </a:r>
+            </a:p>
+            <a:p>
+              <a:r>
+                <a:rPr lang="en-US" sz="1961" dirty="0" smtClean="0">
+                  <a:solidFill>
+                    <a:srgbClr val="FFFFFF"/>
+                  </a:solidFill>
+                  <a:cs typeface="Segoe UI Light" panose="020B0502040204020203" pitchFamily="34" charset="0"/>
+                </a:rPr>
+                <a:t>WITH MSDN</a:t>
+              </a:r>
+              <a:endParaRPr lang="en-US" sz="1961" dirty="0">
+                <a:solidFill>
+                  <a:srgbClr val="FFFFFF"/>
+                </a:solidFill>
               </a:endParaRPr>
             </a:p>
           </p:txBody>
         </p:sp>
         <p:sp>
           <p:nvSpPr>
-            <p:cNvPr id="40" name="Oval 39"/>
+            <p:cNvPr id="60" name="Rectangle 59"/>
             <p:cNvSpPr/>
             <p:nvPr/>
           </p:nvSpPr>
-          <p:spPr bwMode="auto">
+          <p:spPr>
             <a:xfrm>
-              <a:off x="3282186" y="5928878"/>
-              <a:ext cx="217922" cy="217922"/>
+              <a:off x="8411036" y="3977051"/>
+              <a:ext cx="3753311" cy="1884491"/>
             </a:xfrm>
-            <a:prstGeom prst="ellipse">
+            <a:prstGeom prst="rect">
               <a:avLst/>
             </a:prstGeom>
-            <a:solidFill>
-              <a:srgbClr val="11C1FF"/>
-            </a:solidFill>
-            <a:ln>
-              <a:noFill/>
-              <a:headEnd type="none" w="med" len="med"/>
-              <a:tailEnd type="none" w="med" len="med"/>
-            </a:ln>
-            <a:effectLst/>
           </p:spPr>
-          <p:style>
-            <a:lnRef idx="1">
-              <a:schemeClr val="accent2"/>
-            </a:lnRef>
-            <a:fillRef idx="3">
-              <a:schemeClr val="accent2"/>
-            </a:fillRef>
-            <a:effectRef idx="2">
-              <a:schemeClr val="accent2"/>
-            </a:effectRef>
-            <a:fontRef idx="minor">
-              <a:schemeClr val="lt1"/>
-            </a:fontRef>
-          </p:style>
           <p:txBody>
-            <a:bodyPr lIns="89642" tIns="89642" rIns="33620" bIns="33620" rtlCol="0" anchor="t" anchorCtr="0"/>
+            <a:bodyPr wrap="square" anchor="ctr">
+              <a:spAutoFit/>
+            </a:bodyPr>
             <a:lstStyle/>
             <a:p>
-              <a:pPr algn="ctr" defTabSz="914038"/>
-              <a:endParaRPr lang="en-US" sz="1568" spc="-100" dirty="0">
-                <a:gradFill>
-                  <a:gsLst>
-                    <a:gs pos="0">
-                      <a:srgbClr val="FFFFFF"/>
-                    </a:gs>
-                    <a:gs pos="100000">
-                      <a:srgbClr val="FFFFFF"/>
-                    </a:gs>
-                  </a:gsLst>
-                  <a:lin ang="5400000" scaled="0"/>
-                </a:gradFill>
-                <a:ea typeface="Segoe UI" pitchFamily="34" charset="0"/>
-                <a:cs typeface="Segoe UI" pitchFamily="34" charset="0"/>
+              <a:pPr algn="ctr">
+                <a:lnSpc>
+                  <a:spcPct val="95000"/>
+                </a:lnSpc>
+                <a:buSzPct val="90000"/>
+              </a:pPr>
+              <a:r>
+                <a:rPr lang="en-US" sz="13600" dirty="0" smtClean="0">
+                  <a:solidFill>
+                    <a:srgbClr val="11C1FF"/>
+                  </a:solidFill>
+                  <a:latin typeface="Segoe UI Light" panose="020B0502040204020203" pitchFamily="34" charset="0"/>
+                  <a:cs typeface="Segoe UI Light" panose="020B0502040204020203" pitchFamily="34" charset="0"/>
+                </a:rPr>
+                <a:t>$</a:t>
+              </a:r>
+              <a:r>
+                <a:rPr lang="en-US" sz="13600" dirty="0" smtClean="0">
+                  <a:solidFill>
+                    <a:schemeClr val="bg1"/>
+                  </a:solidFill>
+                  <a:latin typeface="Segoe UI Light" panose="020B0502040204020203" pitchFamily="34" charset="0"/>
+                  <a:cs typeface="Segoe UI Light" panose="020B0502040204020203" pitchFamily="34" charset="0"/>
+                </a:rPr>
+                <a:t>100</a:t>
+              </a:r>
+              <a:endParaRPr lang="en-US" sz="13600" dirty="0">
+                <a:solidFill>
+                  <a:schemeClr val="bg1"/>
+                </a:solidFill>
+                <a:latin typeface="Segoe UI Light" panose="020B0502040204020203" pitchFamily="34" charset="0"/>
+                <a:cs typeface="Segoe UI Light" panose="020B0502040204020203" pitchFamily="34" charset="0"/>
               </a:endParaRPr>
             </a:p>
           </p:txBody>
         </p:sp>
       </p:grpSp>
-      <p:sp>
-        <p:nvSpPr>
-          <p:cNvPr id="3" name="TextBox 2"/>
-          <p:cNvSpPr txBox="1"/>
+      <p:grpSp>
+        <p:nvGrpSpPr>
+          <p:cNvPr id="61" name="Group 60"/>
+          <p:cNvGrpSpPr/>
           <p:nvPr/>
-        </p:nvSpPr>
-        <p:spPr>
+        </p:nvGrpSpPr>
+        <p:grpSpPr>
           <a:xfrm>
-            <a:off x="3668233" y="2925095"/>
-            <a:ext cx="5114260" cy="1200329"/>
+            <a:off x="8262885" y="3393388"/>
+            <a:ext cx="3816737" cy="2971047"/>
+            <a:chOff x="8411035" y="3977051"/>
+            <a:chExt cx="3893271" cy="2691047"/>
           </a:xfrm>
-          <a:prstGeom prst="rect">
-            <a:avLst/>
-          </a:prstGeom>
-          <a:noFill/>
-        </p:spPr>
-        <p:txBody>
-          <a:bodyPr wrap="square" rtlCol="0">
-            <a:spAutoFit/>
-          </a:bodyPr>
-          <a:lstStyle/>
-          <a:p>
-            <a:pPr algn="ctr"/>
-            <a:r>
-              <a:rPr lang="en-US" sz="7200" dirty="0" smtClean="0">
+        </p:grpSpPr>
+        <p:sp>
+          <p:nvSpPr>
+            <p:cNvPr id="62" name="TextBox 61"/>
+            <p:cNvSpPr txBox="1"/>
+            <p:nvPr/>
+          </p:nvSpPr>
+          <p:spPr>
+            <a:xfrm>
+              <a:off x="8411035" y="5764532"/>
+              <a:ext cx="3893271" cy="903566"/>
+            </a:xfrm>
+            <a:prstGeom prst="rect">
+              <a:avLst/>
+            </a:prstGeom>
+            <a:noFill/>
+          </p:spPr>
+          <p:txBody>
+            <a:bodyPr wrap="square" rtlCol="0">
+              <a:spAutoFit/>
+            </a:bodyPr>
+            <a:lstStyle/>
+            <a:p>
+              <a:r>
+                <a:rPr lang="en-US" sz="1961" b="1" dirty="0" smtClean="0">
+                  <a:solidFill>
+                    <a:srgbClr val="FFFFFF"/>
+                  </a:solidFill>
+                  <a:cs typeface="Segoe UI Light" panose="020B0502040204020203" pitchFamily="34" charset="0"/>
+                </a:rPr>
+                <a:t>MONTHLY CREDIT</a:t>
+              </a:r>
+            </a:p>
+            <a:p>
+              <a:r>
+                <a:rPr lang="en-US" sz="1961" dirty="0" smtClean="0">
+                  <a:solidFill>
+                    <a:srgbClr val="FFFFFF"/>
+                  </a:solidFill>
+                  <a:cs typeface="Segoe UI Light" panose="020B0502040204020203" pitchFamily="34" charset="0"/>
+                </a:rPr>
+                <a:t>VISUAL STUDIO </a:t>
+              </a:r>
+              <a:r>
+                <a:rPr lang="en-US" sz="1961" b="1" dirty="0" smtClean="0">
+                  <a:solidFill>
+                    <a:srgbClr val="FFFFFF"/>
+                  </a:solidFill>
+                  <a:cs typeface="Segoe UI Light" panose="020B0502040204020203" pitchFamily="34" charset="0"/>
+                </a:rPr>
+                <a:t>PROFESSIONAL</a:t>
+              </a:r>
+              <a:r>
+                <a:rPr lang="en-US" sz="1961" dirty="0" smtClean="0">
+                  <a:solidFill>
+                    <a:srgbClr val="FFFFFF"/>
+                  </a:solidFill>
+                  <a:cs typeface="Segoe UI Light" panose="020B0502040204020203" pitchFamily="34" charset="0"/>
+                </a:rPr>
+                <a:t> WITH MSDN</a:t>
+              </a:r>
+              <a:endParaRPr lang="en-US" sz="1961" dirty="0">
                 <a:solidFill>
-                  <a:schemeClr val="accent4">
-                    <a:lumMod val="60000"/>
-                    <a:lumOff val="40000"/>
-                  </a:schemeClr>
+                  <a:srgbClr val="FFFFFF"/>
                 </a:solidFill>
-              </a:rPr>
-              <a:t>EXAMPLE</a:t>
-            </a:r>
-            <a:endParaRPr lang="en-US" sz="7200" dirty="0">
-              <a:solidFill>
-                <a:schemeClr val="accent4">
-                  <a:lumMod val="60000"/>
-                  <a:lumOff val="40000"/>
-                </a:schemeClr>
-              </a:solidFill>
-            </a:endParaRPr>
-          </a:p>
-        </p:txBody>
-      </p:sp>
+              </a:endParaRPr>
+            </a:p>
+          </p:txBody>
+        </p:sp>
+        <p:sp>
+          <p:nvSpPr>
+            <p:cNvPr id="63" name="Rectangle 62"/>
+            <p:cNvSpPr/>
+            <p:nvPr/>
+          </p:nvSpPr>
+          <p:spPr>
+            <a:xfrm>
+              <a:off x="8411036" y="3977051"/>
+              <a:ext cx="3753311" cy="1884491"/>
+            </a:xfrm>
+            <a:prstGeom prst="rect">
+              <a:avLst/>
+            </a:prstGeom>
+          </p:spPr>
+          <p:txBody>
+            <a:bodyPr wrap="square" anchor="ctr">
+              <a:spAutoFit/>
+            </a:bodyPr>
+            <a:lstStyle/>
+            <a:p>
+              <a:pPr algn="ctr">
+                <a:lnSpc>
+                  <a:spcPct val="95000"/>
+                </a:lnSpc>
+                <a:buSzPct val="90000"/>
+              </a:pPr>
+              <a:r>
+                <a:rPr lang="en-US" sz="13600" dirty="0" smtClean="0">
+                  <a:solidFill>
+                    <a:srgbClr val="11C1FF"/>
+                  </a:solidFill>
+                  <a:latin typeface="Segoe UI Light" panose="020B0502040204020203" pitchFamily="34" charset="0"/>
+                  <a:cs typeface="Segoe UI Light" panose="020B0502040204020203" pitchFamily="34" charset="0"/>
+                </a:rPr>
+                <a:t>$</a:t>
+              </a:r>
+              <a:r>
+                <a:rPr lang="en-US" sz="13600" dirty="0">
+                  <a:solidFill>
+                    <a:schemeClr val="bg1"/>
+                  </a:solidFill>
+                  <a:latin typeface="Segoe UI Light" panose="020B0502040204020203" pitchFamily="34" charset="0"/>
+                  <a:cs typeface="Segoe UI Light" panose="020B0502040204020203" pitchFamily="34" charset="0"/>
+                </a:rPr>
+                <a:t>5</a:t>
+              </a:r>
+              <a:r>
+                <a:rPr lang="en-US" sz="13600" dirty="0" smtClean="0">
+                  <a:solidFill>
+                    <a:schemeClr val="bg1"/>
+                  </a:solidFill>
+                  <a:latin typeface="Segoe UI Light" panose="020B0502040204020203" pitchFamily="34" charset="0"/>
+                  <a:cs typeface="Segoe UI Light" panose="020B0502040204020203" pitchFamily="34" charset="0"/>
+                </a:rPr>
+                <a:t>0</a:t>
+              </a:r>
+              <a:endParaRPr lang="en-US" sz="13600" dirty="0">
+                <a:solidFill>
+                  <a:schemeClr val="bg1"/>
+                </a:solidFill>
+                <a:latin typeface="Segoe UI Light" panose="020B0502040204020203" pitchFamily="34" charset="0"/>
+                <a:cs typeface="Segoe UI Light" panose="020B0502040204020203" pitchFamily="34" charset="0"/>
+              </a:endParaRPr>
+            </a:p>
+          </p:txBody>
+        </p:sp>
+      </p:grpSp>
     </p:spTree>
     <p:extLst>
       <p:ext uri="{BB962C8B-B14F-4D97-AF65-F5344CB8AC3E}">
@@ -23430,7 +22884,7 @@
                               <p:par>
                                 <p:cTn id="20" presetID="10" presetClass="entr" presetSubtype="0" fill="hold" nodeType="withEffect">
                                   <p:stCondLst>
-                                    <p:cond delay="250"/>
+                                    <p:cond delay="100"/>
                                   </p:stCondLst>
                                   <p:childTnLst>
                                     <p:set>
@@ -23441,7 +22895,7 @@
                                           </p:stCondLst>
                                         </p:cTn>
                                         <p:tgtEl>
-                                          <p:spTgt spid="4"/>
+                                          <p:spTgt spid="44"/>
                                         </p:tgtEl>
                                         <p:attrNameLst>
                                           <p:attrName>style.visibility</p:attrName>
@@ -23455,7 +22909,7 @@
                                       <p:cBhvr>
                                         <p:cTn id="22" dur="250"/>
                                         <p:tgtEl>
-                                          <p:spTgt spid="4"/>
+                                          <p:spTgt spid="44"/>
                                         </p:tgtEl>
                                       </p:cBhvr>
                                     </p:animEffect>
@@ -23465,7 +22919,7 @@
                               <p:par>
                                 <p:cTn id="23" presetID="10" presetClass="entr" presetSubtype="0" fill="hold" nodeType="withEffect">
                                   <p:stCondLst>
-                                    <p:cond delay="300"/>
+                                    <p:cond delay="100"/>
                                   </p:stCondLst>
                                   <p:childTnLst>
                                     <p:set>
@@ -23476,7 +22930,7 @@
                                           </p:stCondLst>
                                         </p:cTn>
                                         <p:tgtEl>
-                                          <p:spTgt spid="17"/>
+                                          <p:spTgt spid="47"/>
                                         </p:tgtEl>
                                         <p:attrNameLst>
                                           <p:attrName>style.visibility</p:attrName>
@@ -23490,7 +22944,7 @@
                                       <p:cBhvr>
                                         <p:cTn id="25" dur="250"/>
                                         <p:tgtEl>
-                                          <p:spTgt spid="17"/>
+                                          <p:spTgt spid="47"/>
                                         </p:tgtEl>
                                       </p:cBhvr>
                                     </p:animEffect>
@@ -23500,7 +22954,7 @@
                               <p:par>
                                 <p:cTn id="26" presetID="10" presetClass="entr" presetSubtype="0" fill="hold" nodeType="withEffect">
                                   <p:stCondLst>
-                                    <p:cond delay="250"/>
+                                    <p:cond delay="100"/>
                                   </p:stCondLst>
                                   <p:childTnLst>
                                     <p:set>
@@ -23511,7 +22965,7 @@
                                           </p:stCondLst>
                                         </p:cTn>
                                         <p:tgtEl>
-                                          <p:spTgt spid="29"/>
+                                          <p:spTgt spid="58"/>
                                         </p:tgtEl>
                                         <p:attrNameLst>
                                           <p:attrName>style.visibility</p:attrName>
@@ -23525,7 +22979,7 @@
                                       <p:cBhvr>
                                         <p:cTn id="28" dur="250"/>
                                         <p:tgtEl>
-                                          <p:spTgt spid="29"/>
+                                          <p:spTgt spid="58"/>
                                         </p:tgtEl>
                                       </p:cBhvr>
                                     </p:animEffect>
@@ -23535,7 +22989,7 @@
                               <p:par>
                                 <p:cTn id="29" presetID="10" presetClass="entr" presetSubtype="0" fill="hold" nodeType="withEffect">
                                   <p:stCondLst>
-                                    <p:cond delay="250"/>
+                                    <p:cond delay="100"/>
                                   </p:stCondLst>
                                   <p:childTnLst>
                                     <p:set>
@@ -23546,7 +23000,7 @@
                                           </p:stCondLst>
                                         </p:cTn>
                                         <p:tgtEl>
-                                          <p:spTgt spid="5"/>
+                                          <p:spTgt spid="61"/>
                                         </p:tgtEl>
                                         <p:attrNameLst>
                                           <p:attrName>style.visibility</p:attrName>
@@ -23560,7 +23014,7 @@
                                       <p:cBhvr>
                                         <p:cTn id="31" dur="250"/>
                                         <p:tgtEl>
-                                          <p:spTgt spid="5"/>
+                                          <p:spTgt spid="61"/>
                                         </p:tgtEl>
                                       </p:cBhvr>
                                     </p:animEffect>
@@ -23592,6 +23046,126 @@
             </p:seq>
           </p:childTnLst>
         </p:cTn>
+      </p:par>
+    </p:tnLst>
+  </p:timing>
+</p:sld>
+</file>
+
+<file path=ppt/slides/slide18.xml><?xml version="1.0" encoding="utf-8"?>
+<p:sld xmlns:a="http://schemas.openxmlformats.org/drawingml/2006/main" xmlns:r="http://schemas.openxmlformats.org/officeDocument/2006/relationships" xmlns:p="http://schemas.openxmlformats.org/presentationml/2006/main">
+  <p:cSld>
+    <p:bg>
+      <p:bgPr>
+        <a:solidFill>
+          <a:srgbClr val="00518E"/>
+        </a:solidFill>
+        <a:effectLst/>
+      </p:bgPr>
+    </p:bg>
+    <p:spTree>
+      <p:nvGrpSpPr>
+        <p:cNvPr id="1" name=""/>
+        <p:cNvGrpSpPr/>
+        <p:nvPr/>
+      </p:nvGrpSpPr>
+      <p:grpSpPr>
+        <a:xfrm>
+          <a:off x="0" y="0"/>
+          <a:ext cx="0" cy="0"/>
+          <a:chOff x="0" y="0"/>
+          <a:chExt cx="0" cy="0"/>
+        </a:xfrm>
+      </p:grpSpPr>
+      <p:sp>
+        <p:nvSpPr>
+          <p:cNvPr id="2" name="Title 1"/>
+          <p:cNvSpPr>
+            <a:spLocks noGrp="1"/>
+          </p:cNvSpPr>
+          <p:nvPr>
+            <p:ph type="title"/>
+          </p:nvPr>
+        </p:nvSpPr>
+        <p:spPr/>
+        <p:txBody>
+          <a:bodyPr/>
+          <a:lstStyle/>
+          <a:p>
+            <a:r>
+              <a:rPr lang="en-US" dirty="0" smtClean="0"/>
+              <a:t>Windows Azure</a:t>
+            </a:r>
+            <a:endParaRPr lang="en-US" dirty="0"/>
+          </a:p>
+        </p:txBody>
+      </p:sp>
+      <p:pic>
+        <p:nvPicPr>
+          <p:cNvPr id="6" name="Content Placeholder 5"/>
+          <p:cNvPicPr>
+            <a:picLocks noGrp="1" noChangeAspect="1"/>
+          </p:cNvPicPr>
+          <p:nvPr>
+            <p:ph idx="1"/>
+          </p:nvPr>
+        </p:nvPicPr>
+        <p:blipFill>
+          <a:blip r:embed="rId2">
+            <a:extLst>
+              <a:ext uri="{28A0092B-C50C-407E-A947-70E740481C1C}">
+                <a14:useLocalDpi xmlns:a14="http://schemas.microsoft.com/office/drawing/2010/main" val="0"/>
+              </a:ext>
+            </a:extLst>
+          </a:blip>
+          <a:stretch>
+            <a:fillRect/>
+          </a:stretch>
+        </p:blipFill>
+        <p:spPr>
+          <a:xfrm>
+            <a:off x="795130" y="1828966"/>
+            <a:ext cx="10772844" cy="3918712"/>
+          </a:xfrm>
+        </p:spPr>
+      </p:pic>
+      <p:sp>
+        <p:nvSpPr>
+          <p:cNvPr id="4" name="Slide Number Placeholder 3"/>
+          <p:cNvSpPr>
+            <a:spLocks noGrp="1"/>
+          </p:cNvSpPr>
+          <p:nvPr>
+            <p:ph type="sldNum" sz="quarter" idx="12"/>
+          </p:nvPr>
+        </p:nvSpPr>
+        <p:spPr/>
+        <p:txBody>
+          <a:bodyPr/>
+          <a:lstStyle/>
+          <a:p>
+            <a:fld id="{0A164282-434E-41D4-9582-783D542A7B68}" type="slidenum">
+              <a:rPr lang="en-US" smtClean="0"/>
+              <a:t>18</a:t>
+            </a:fld>
+            <a:endParaRPr lang="en-US"/>
+          </a:p>
+        </p:txBody>
+      </p:sp>
+    </p:spTree>
+    <p:extLst>
+      <p:ext uri="{BB962C8B-B14F-4D97-AF65-F5344CB8AC3E}">
+        <p14:creationId xmlns:p14="http://schemas.microsoft.com/office/powerpoint/2010/main" val="956239148"/>
+      </p:ext>
+    </p:extLst>
+  </p:cSld>
+  <p:clrMapOvr>
+    <a:masterClrMapping/>
+  </p:clrMapOvr>
+  <p:timing>
+    <p:tnLst>
+      <p:par>
+        <p:cTn id="1" dur="indefinite" restart="never" nodeType="tmRoot"/>
       </p:par>
     </p:tnLst>
   </p:timing>
@@ -23646,15 +23220,36 @@
           </a:p>
         </p:txBody>
       </p:sp>
+      <p:sp>
+        <p:nvSpPr>
+          <p:cNvPr id="4" name="Slide Number Placeholder 3"/>
+          <p:cNvSpPr>
+            <a:spLocks noGrp="1"/>
+          </p:cNvSpPr>
+          <p:nvPr>
+            <p:ph type="sldNum" sz="quarter" idx="12"/>
+          </p:nvPr>
+        </p:nvSpPr>
+        <p:spPr/>
+        <p:txBody>
+          <a:bodyPr/>
+          <a:lstStyle/>
+          <a:p>
+            <a:fld id="{0A164282-434E-41D4-9582-783D542A7B68}" type="slidenum">
+              <a:rPr lang="en-US" smtClean="0"/>
+              <a:t>19</a:t>
+            </a:fld>
+            <a:endParaRPr lang="en-US"/>
+          </a:p>
+        </p:txBody>
+      </p:sp>
       <p:pic>
         <p:nvPicPr>
-          <p:cNvPr id="6" name="Content Placeholder 5"/>
+          <p:cNvPr id="3" name="Picture 2"/>
           <p:cNvPicPr>
-            <a:picLocks noGrp="1" noChangeAspect="1"/>
+            <a:picLocks noChangeAspect="1"/>
           </p:cNvPicPr>
-          <p:nvPr>
-            <p:ph idx="1"/>
-          </p:nvPr>
+          <p:nvPr/>
         </p:nvPicPr>
         <p:blipFill>
           <a:blip r:embed="rId2">
@@ -23670,38 +23265,18 @@
         </p:blipFill>
         <p:spPr>
           <a:xfrm>
-            <a:off x="795130" y="1828966"/>
-            <a:ext cx="10772844" cy="3918712"/>
+            <a:off x="560798" y="2429299"/>
+            <a:ext cx="10591278" cy="2697466"/>
           </a:xfrm>
+          <a:prstGeom prst="rect">
+            <a:avLst/>
+          </a:prstGeom>
         </p:spPr>
       </p:pic>
-      <p:sp>
-        <p:nvSpPr>
-          <p:cNvPr id="4" name="Slide Number Placeholder 3"/>
-          <p:cNvSpPr>
-            <a:spLocks noGrp="1"/>
-          </p:cNvSpPr>
-          <p:nvPr>
-            <p:ph type="sldNum" sz="quarter" idx="12"/>
-          </p:nvPr>
-        </p:nvSpPr>
-        <p:spPr/>
-        <p:txBody>
-          <a:bodyPr/>
-          <a:lstStyle/>
-          <a:p>
-            <a:fld id="{0A164282-434E-41D4-9582-783D542A7B68}" type="slidenum">
-              <a:rPr lang="en-US" smtClean="0"/>
-              <a:t>19</a:t>
-            </a:fld>
-            <a:endParaRPr lang="en-US"/>
-          </a:p>
-        </p:txBody>
-      </p:sp>
     </p:spTree>
     <p:extLst>
       <p:ext uri="{BB962C8B-B14F-4D97-AF65-F5344CB8AC3E}">
-        <p14:creationId xmlns:p14="http://schemas.microsoft.com/office/powerpoint/2010/main" val="956239148"/>
+        <p14:creationId xmlns:p14="http://schemas.microsoft.com/office/powerpoint/2010/main" val="3568708487"/>
       </p:ext>
     </p:extLst>
   </p:cSld>
@@ -24778,7 +24353,7 @@
       </p:sp>
       <p:pic>
         <p:nvPicPr>
-          <p:cNvPr id="3" name="Picture 2"/>
+          <p:cNvPr id="5" name="Picture 4"/>
           <p:cNvPicPr>
             <a:picLocks noChangeAspect="1"/>
           </p:cNvPicPr>
@@ -24798,8 +24373,8 @@
         </p:blipFill>
         <p:spPr>
           <a:xfrm>
-            <a:off x="560798" y="2429299"/>
-            <a:ext cx="10591278" cy="2697466"/>
+            <a:off x="455432" y="2697112"/>
+            <a:ext cx="11185188" cy="2604050"/>
           </a:xfrm>
           <a:prstGeom prst="rect">
             <a:avLst/>
@@ -24809,7 +24384,7 @@
     </p:spTree>
     <p:extLst>
       <p:ext uri="{BB962C8B-B14F-4D97-AF65-F5344CB8AC3E}">
-        <p14:creationId xmlns:p14="http://schemas.microsoft.com/office/powerpoint/2010/main" val="3568708487"/>
+        <p14:creationId xmlns:p14="http://schemas.microsoft.com/office/powerpoint/2010/main" val="2861930090"/>
       </p:ext>
     </p:extLst>
   </p:cSld>
@@ -24919,127 +24494,6 @@
         </p:blipFill>
         <p:spPr>
           <a:xfrm>
-            <a:off x="455432" y="2697112"/>
-            <a:ext cx="11185188" cy="2604050"/>
-          </a:xfrm>
-          <a:prstGeom prst="rect">
-            <a:avLst/>
-          </a:prstGeom>
-        </p:spPr>
-      </p:pic>
-    </p:spTree>
-    <p:extLst>
-      <p:ext uri="{BB962C8B-B14F-4D97-AF65-F5344CB8AC3E}">
-        <p14:creationId xmlns:p14="http://schemas.microsoft.com/office/powerpoint/2010/main" val="2861930090"/>
-      </p:ext>
-    </p:extLst>
-  </p:cSld>
-  <p:clrMapOvr>
-    <a:masterClrMapping/>
-  </p:clrMapOvr>
-  <p:timing>
-    <p:tnLst>
-      <p:par>
-        <p:cTn id="1" dur="indefinite" restart="never" nodeType="tmRoot"/>
-      </p:par>
-    </p:tnLst>
-  </p:timing>
-</p:sld>
-</file>
-
-<file path=ppt/slides/slide22.xml><?xml version="1.0" encoding="utf-8"?>
-<p:sld xmlns:a="http://schemas.openxmlformats.org/drawingml/2006/main" xmlns:r="http://schemas.openxmlformats.org/officeDocument/2006/relationships" xmlns:p="http://schemas.openxmlformats.org/presentationml/2006/main">
-  <p:cSld>
-    <p:bg>
-      <p:bgPr>
-        <a:solidFill>
-          <a:srgbClr val="00518E"/>
-        </a:solidFill>
-        <a:effectLst/>
-      </p:bgPr>
-    </p:bg>
-    <p:spTree>
-      <p:nvGrpSpPr>
-        <p:cNvPr id="1" name=""/>
-        <p:cNvGrpSpPr/>
-        <p:nvPr/>
-      </p:nvGrpSpPr>
-      <p:grpSpPr>
-        <a:xfrm>
-          <a:off x="0" y="0"/>
-          <a:ext cx="0" cy="0"/>
-          <a:chOff x="0" y="0"/>
-          <a:chExt cx="0" cy="0"/>
-        </a:xfrm>
-      </p:grpSpPr>
-      <p:sp>
-        <p:nvSpPr>
-          <p:cNvPr id="2" name="Title 1"/>
-          <p:cNvSpPr>
-            <a:spLocks noGrp="1"/>
-          </p:cNvSpPr>
-          <p:nvPr>
-            <p:ph type="title"/>
-          </p:nvPr>
-        </p:nvSpPr>
-        <p:spPr/>
-        <p:txBody>
-          <a:bodyPr/>
-          <a:lstStyle/>
-          <a:p>
-            <a:r>
-              <a:rPr lang="en-US" dirty="0" smtClean="0"/>
-              <a:t>Windows Azure</a:t>
-            </a:r>
-            <a:endParaRPr lang="en-US" dirty="0"/>
-          </a:p>
-        </p:txBody>
-      </p:sp>
-      <p:sp>
-        <p:nvSpPr>
-          <p:cNvPr id="4" name="Slide Number Placeholder 3"/>
-          <p:cNvSpPr>
-            <a:spLocks noGrp="1"/>
-          </p:cNvSpPr>
-          <p:nvPr>
-            <p:ph type="sldNum" sz="quarter" idx="12"/>
-          </p:nvPr>
-        </p:nvSpPr>
-        <p:spPr/>
-        <p:txBody>
-          <a:bodyPr/>
-          <a:lstStyle/>
-          <a:p>
-            <a:fld id="{0A164282-434E-41D4-9582-783D542A7B68}" type="slidenum">
-              <a:rPr lang="en-US" smtClean="0"/>
-              <a:t>22</a:t>
-            </a:fld>
-            <a:endParaRPr lang="en-US"/>
-          </a:p>
-        </p:txBody>
-      </p:sp>
-      <p:pic>
-        <p:nvPicPr>
-          <p:cNvPr id="5" name="Picture 4"/>
-          <p:cNvPicPr>
-            <a:picLocks noChangeAspect="1"/>
-          </p:cNvPicPr>
-          <p:nvPr/>
-        </p:nvPicPr>
-        <p:blipFill>
-          <a:blip r:embed="rId2">
-            <a:extLst>
-              <a:ext uri="{28A0092B-C50C-407E-A947-70E740481C1C}">
-                <a14:useLocalDpi xmlns:a14="http://schemas.microsoft.com/office/drawing/2010/main" val="0"/>
-              </a:ext>
-            </a:extLst>
-          </a:blip>
-          <a:stretch>
-            <a:fillRect/>
-          </a:stretch>
-        </p:blipFill>
-        <p:spPr>
-          <a:xfrm>
             <a:off x="900774" y="2330998"/>
             <a:ext cx="10739846" cy="2533934"/>
           </a:xfrm>
@@ -25068,7 +24522,7 @@
 </p:sld>
 </file>
 
-<file path=ppt/slides/slide23.xml><?xml version="1.0" encoding="utf-8"?>
+<file path=ppt/slides/slide22.xml><?xml version="1.0" encoding="utf-8"?>
 <p:sld xmlns:a="http://schemas.openxmlformats.org/drawingml/2006/main" xmlns:r="http://schemas.openxmlformats.org/officeDocument/2006/relationships" xmlns:p="http://schemas.openxmlformats.org/presentationml/2006/main">
   <p:cSld>
     <p:spTree>
@@ -25106,7 +24560,7 @@
           <a:graphicData uri="http://schemas.openxmlformats.org/presentationml/2006/ole">
             <mc:AlternateContent xmlns:mc="http://schemas.openxmlformats.org/markup-compatibility/2006">
               <mc:Choice xmlns:v="urn:schemas-microsoft-com:vml" Requires="v">
-                <p:oleObj spid="_x0000_s8198" name="think-cell Slide" r:id="rId5" imgW="270" imgH="270" progId="TCLayout.ActiveDocument.1">
+                <p:oleObj spid="_x0000_s8200" name="think-cell Slide" r:id="rId5" imgW="270" imgH="270" progId="TCLayout.ActiveDocument.1">
                   <p:embed/>
                 </p:oleObj>
               </mc:Choice>
@@ -25697,7 +25151,7 @@
 </p:sld>
 </file>
 
-<file path=ppt/slides/slide24.xml><?xml version="1.0" encoding="utf-8"?>
+<file path=ppt/slides/slide23.xml><?xml version="1.0" encoding="utf-8"?>
 <p:sld xmlns:a="http://schemas.openxmlformats.org/drawingml/2006/main" xmlns:r="http://schemas.openxmlformats.org/officeDocument/2006/relationships" xmlns:p="http://schemas.openxmlformats.org/presentationml/2006/main">
   <p:cSld>
     <p:spTree>
@@ -25735,7 +25189,7 @@
           <a:graphicData uri="http://schemas.openxmlformats.org/presentationml/2006/ole">
             <mc:AlternateContent xmlns:mc="http://schemas.openxmlformats.org/markup-compatibility/2006">
               <mc:Choice xmlns:v="urn:schemas-microsoft-com:vml" Requires="v">
-                <p:oleObj spid="_x0000_s7179" name="think-cell Slide" r:id="rId6" imgW="270" imgH="270" progId="TCLayout.ActiveDocument.1">
+                <p:oleObj spid="_x0000_s7181" name="think-cell Slide" r:id="rId6" imgW="270" imgH="270" progId="TCLayout.ActiveDocument.1">
                   <p:embed/>
                 </p:oleObj>
               </mc:Choice>
@@ -26270,7 +25724,7 @@
 </p:sld>
 </file>
 
-<file path=ppt/slides/slide25.xml><?xml version="1.0" encoding="utf-8"?>
+<file path=ppt/slides/slide24.xml><?xml version="1.0" encoding="utf-8"?>
 <p:sld xmlns:a="http://schemas.openxmlformats.org/drawingml/2006/main" xmlns:r="http://schemas.openxmlformats.org/officeDocument/2006/relationships" xmlns:p="http://schemas.openxmlformats.org/presentationml/2006/main">
   <p:cSld>
     <p:bg>
@@ -26367,7 +25821,7 @@
           <a:graphicData uri="http://schemas.openxmlformats.org/presentationml/2006/ole">
             <mc:AlternateContent xmlns:mc="http://schemas.openxmlformats.org/markup-compatibility/2006">
               <mc:Choice xmlns:v="urn:schemas-microsoft-com:vml" Requires="v">
-                <p:oleObj spid="_x0000_s1034" name="think-cell Slide" r:id="rId5" imgW="270" imgH="270" progId="TCLayout.ActiveDocument.1">
+                <p:oleObj spid="_x0000_s1036" name="think-cell Slide" r:id="rId5" imgW="270" imgH="270" progId="TCLayout.ActiveDocument.1">
                   <p:embed/>
                 </p:oleObj>
               </mc:Choice>
@@ -26996,7 +26450,7 @@
           <a:graphicData uri="http://schemas.openxmlformats.org/presentationml/2006/ole">
             <mc:AlternateContent xmlns:mc="http://schemas.openxmlformats.org/markup-compatibility/2006">
               <mc:Choice xmlns:v="urn:schemas-microsoft-com:vml" Requires="v">
-                <p:oleObj spid="_x0000_s2059" name="think-cell Slide" r:id="rId5" imgW="270" imgH="270" progId="TCLayout.ActiveDocument.1">
+                <p:oleObj spid="_x0000_s2061" name="think-cell Slide" r:id="rId5" imgW="270" imgH="270" progId="TCLayout.ActiveDocument.1">
                   <p:embed/>
                 </p:oleObj>
               </mc:Choice>
@@ -27914,7 +27368,7 @@
           <a:graphicData uri="http://schemas.openxmlformats.org/presentationml/2006/ole">
             <mc:AlternateContent xmlns:mc="http://schemas.openxmlformats.org/markup-compatibility/2006">
               <mc:Choice xmlns:v="urn:schemas-microsoft-com:vml" Requires="v">
-                <p:oleObj spid="_x0000_s3082" name="think-cell Slide" r:id="rId5" imgW="270" imgH="270" progId="TCLayout.ActiveDocument.1">
+                <p:oleObj spid="_x0000_s3084" name="think-cell Slide" r:id="rId5" imgW="270" imgH="270" progId="TCLayout.ActiveDocument.1">
                   <p:embed/>
                 </p:oleObj>
               </mc:Choice>
@@ -29726,7 +29180,7 @@
           <a:graphicData uri="http://schemas.openxmlformats.org/presentationml/2006/ole">
             <mc:AlternateContent xmlns:mc="http://schemas.openxmlformats.org/markup-compatibility/2006">
               <mc:Choice xmlns:v="urn:schemas-microsoft-com:vml" Requires="v">
-                <p:oleObj spid="_x0000_s4107" name="think-cell Slide" r:id="rId5" imgW="270" imgH="270" progId="TCLayout.ActiveDocument.1">
+                <p:oleObj spid="_x0000_s4109" name="think-cell Slide" r:id="rId5" imgW="270" imgH="270" progId="TCLayout.ActiveDocument.1">
                   <p:embed/>
                 </p:oleObj>
               </mc:Choice>

</xml_diff>